<commit_message>
Updated GIF for Tutorial
</commit_message>
<xml_diff>
--- a/Tableau JSAPI - 02 Tutorial Walkthrough.pptx
+++ b/Tableau JSAPI - 02 Tutorial Walkthrough.pptx
@@ -227,7 +227,7 @@
           <a:p>
             <a:fld id="{F06599F2-9818-4545-AFCB-68953993543F}" type="datetimeFigureOut">
               <a:rPr lang="en-US" smtClean="0"/>
-              <a:t>1/26/16</a:t>
+              <a:t>1/27/16</a:t>
             </a:fld>
             <a:endParaRPr lang="en-US"/>
           </a:p>
@@ -3357,11 +3357,7 @@
           <a:p>
             <a:r>
               <a:rPr lang="en-US" dirty="0" smtClean="0"/>
-              <a:t>JavaScript </a:t>
-            </a:r>
-            <a:r>
-              <a:rPr lang="en-US" dirty="0" smtClean="0"/>
-              <a:t>API</a:t>
+              <a:t>JavaScript API</a:t>
             </a:r>
             <a:br>
               <a:rPr lang="en-US" dirty="0" smtClean="0"/>
@@ -4506,11 +4502,6 @@
               </a:rPr>
               <a:t>Be able to use Toolbar commands to export to PDF and CSV</a:t>
             </a:r>
-            <a:endParaRPr lang="en-US" sz="3200" dirty="0" smtClean="0">
-              <a:latin typeface="Gill Sans MT" charset="0"/>
-              <a:ea typeface="Gill Sans MT" charset="0"/>
-              <a:cs typeface="Gill Sans MT" charset="0"/>
-            </a:endParaRPr>
           </a:p>
           <a:p>
             <a:r>
@@ -5110,8 +5101,8 @@
         </p:blipFill>
         <p:spPr>
           <a:xfrm>
-            <a:off x="4561243" y="2056911"/>
-            <a:ext cx="7358529" cy="4296319"/>
+            <a:off x="5548983" y="2022763"/>
+            <a:ext cx="6557673" cy="4720611"/>
           </a:xfrm>
           <a:prstGeom prst="rect">
             <a:avLst/>

</xml_diff>